<commit_message>
commit directly no stage
</commit_message>
<xml_diff>
--- a/AUNZ-DevOps_LearningMap_v1.2.pptx
+++ b/AUNZ-DevOps_LearningMap_v1.2.pptx
@@ -115,17 +115,32 @@
 </p:presentation>
 </file>
 
-<file path=ppt/revisionInfo.xml><?xml version="1.0" encoding="utf-8"?>
-<p1510:revInfo xmlns:a="http://schemas.openxmlformats.org/drawingml/2006/main" xmlns:r="http://schemas.openxmlformats.org/officeDocument/2006/relationships" xmlns:p1510="http://schemas.microsoft.com/office/powerpoint/2015/10/main">
-  <p1510:revLst>
-    <p1510:client id="{7C11CF97-D7FE-7B46-B9CD-B6B1A743C60E}" v="40" dt="2019-06-25T04:53:30.056"/>
-    <p1510:client id="{A22A1A0E-E549-4A4F-A3A4-075717A15AC0}" v="2" dt="2020-12-02T01:48:00.620"/>
-  </p1510:revLst>
-</p1510:revInfo>
-</file>
-
 <file path=ppt/changesInfos/changesInfo1.xml><?xml version="1.0" encoding="utf-8"?>
 <pc:chgInfo xmlns:a="http://schemas.openxmlformats.org/drawingml/2006/main" xmlns:r="http://schemas.openxmlformats.org/officeDocument/2006/relationships" xmlns:ac="http://schemas.microsoft.com/office/drawing/2013/main/command" xmlns:pc="http://schemas.microsoft.com/office/powerpoint/2013/main/command">
+  <pc:docChgLst>
+    <pc:chgData name="Kumar, Akhil" userId="279735d0-abbb-4599-afd9-7747c4f736a6" providerId="ADAL" clId="{70D32482-7EF5-43AD-9F4F-919C9E8A81A6}"/>
+    <pc:docChg chg="custSel modSld">
+      <pc:chgData name="Kumar, Akhil" userId="279735d0-abbb-4599-afd9-7747c4f736a6" providerId="ADAL" clId="{70D32482-7EF5-43AD-9F4F-919C9E8A81A6}" dt="2021-04-06T09:34:32.656" v="24" actId="5793"/>
+      <pc:docMkLst>
+        <pc:docMk/>
+      </pc:docMkLst>
+      <pc:sldChg chg="modSp">
+        <pc:chgData name="Kumar, Akhil" userId="279735d0-abbb-4599-afd9-7747c4f736a6" providerId="ADAL" clId="{70D32482-7EF5-43AD-9F4F-919C9E8A81A6}" dt="2021-04-06T09:34:32.656" v="24" actId="5793"/>
+        <pc:sldMkLst>
+          <pc:docMk/>
+          <pc:sldMk cId="2099815290" sldId="366"/>
+        </pc:sldMkLst>
+        <pc:spChg chg="mod">
+          <ac:chgData name="Kumar, Akhil" userId="279735d0-abbb-4599-afd9-7747c4f736a6" providerId="ADAL" clId="{70D32482-7EF5-43AD-9F4F-919C9E8A81A6}" dt="2021-04-06T09:34:32.656" v="24" actId="5793"/>
+          <ac:spMkLst>
+            <pc:docMk/>
+            <pc:sldMk cId="2099815290" sldId="366"/>
+            <ac:spMk id="97" creationId="{0A761BD6-7072-4DB4-BB40-1BEB967FD911}"/>
+          </ac:spMkLst>
+        </pc:spChg>
+      </pc:sldChg>
+    </pc:docChg>
+  </pc:docChgLst>
   <pc:docChgLst>
     <pc:chgData name="Narvaneni, Vinitha" userId="S::vinitha.narvaneni@capgemini.com::08cee30e-f366-407b-86ac-c02df9a5bb87" providerId="AD" clId="Web-{A22A1A0E-E549-4A4F-A3A4-075717A15AC0}"/>
     <pc:docChg chg="modSld">
@@ -235,7 +250,7 @@
           <a:p>
             <a:fld id="{BD482B48-0EB9-4BBE-A5F7-FE0EBEF5F7E5}" type="datetimeFigureOut">
               <a:rPr lang="en-AU" smtClean="0"/>
-              <a:t>1/12/2020</a:t>
+              <a:t>6/04/2021</a:t>
             </a:fld>
             <a:endParaRPr lang="en-AU"/>
           </a:p>
@@ -21331,8 +21346,21 @@
                   <a:schemeClr val="tx1"/>
                 </a:solidFill>
               </a:rPr>
-              <a:t>TBD with Cyber team</a:t>
-            </a:r>
+              <a:t>TBD with Cyber team. </a:t>
+            </a:r>
+            <a:r>
+              <a:rPr lang="en-AU" sz="600">
+                <a:solidFill>
+                  <a:schemeClr val="tx1"/>
+                </a:solidFill>
+              </a:rPr>
+              <a:t>Check – V2</a:t>
+            </a:r>
+            <a:endParaRPr lang="en-AU" sz="600" dirty="0">
+              <a:solidFill>
+                <a:schemeClr val="tx1"/>
+              </a:solidFill>
+            </a:endParaRPr>
           </a:p>
         </p:txBody>
       </p:sp>
@@ -23397,16 +23425,8 @@
 <file path=customXml/itemProps1.xml><?xml version="1.0" encoding="utf-8"?>
 <ds:datastoreItem xmlns:ds="http://schemas.openxmlformats.org/officeDocument/2006/customXml" ds:itemID="{E81B63C7-A331-4912-9281-1412933B53DD}">
   <ds:schemaRefs>
+    <ds:schemaRef ds:uri="http://schemas.microsoft.com/office/2006/metadata/properties"/>
     <ds:schemaRef ds:uri="http://schemas.microsoft.com/office/infopath/2007/PartnerControls"/>
-    <ds:schemaRef ds:uri="8a8d3b7e-b270-4c37-b82e-0e6382c9970b"/>
-    <ds:schemaRef ds:uri="http://schemas.microsoft.com/office/2006/documentManagement/types"/>
-    <ds:schemaRef ds:uri="http://www.w3.org/XML/1998/namespace"/>
-    <ds:schemaRef ds:uri="http://purl.org/dc/elements/1.1/"/>
-    <ds:schemaRef ds:uri="http://purl.org/dc/terms/"/>
-    <ds:schemaRef ds:uri="http://schemas.microsoft.com/office/2006/metadata/properties"/>
-    <ds:schemaRef ds:uri="http://schemas.openxmlformats.org/package/2006/metadata/core-properties"/>
-    <ds:schemaRef ds:uri="7638c272-1b8c-4d29-9276-7ecf2d916d47"/>
-    <ds:schemaRef ds:uri="http://purl.org/dc/dcmitype/"/>
   </ds:schemaRefs>
 </ds:datastoreItem>
 </file>
@@ -23420,5 +23440,20 @@
 </file>
 
 <file path=customXml/itemProps3.xml><?xml version="1.0" encoding="utf-8"?>
-<ds:datastoreItem xmlns:ds="http://schemas.openxmlformats.org/officeDocument/2006/customXml" ds:itemID="{DA222334-716A-4FC7-BC3C-F53AA543642B}"/>
+<ds:datastoreItem xmlns:ds="http://schemas.openxmlformats.org/officeDocument/2006/customXml" ds:itemID="{DA222334-716A-4FC7-BC3C-F53AA543642B}">
+  <ds:schemaRefs>
+    <ds:schemaRef ds:uri="http://schemas.microsoft.com/office/2006/metadata/contentType"/>
+    <ds:schemaRef ds:uri="http://schemas.microsoft.com/office/2006/metadata/properties/metaAttributes"/>
+    <ds:schemaRef ds:uri="http://www.w3.org/2001/XMLSchema"/>
+    <ds:schemaRef ds:uri="http://schemas.microsoft.com/office/2006/metadata/properties"/>
+    <ds:schemaRef ds:uri="f9eb89be-a3f4-4eb6-8179-72ad7559de8c"/>
+    <ds:schemaRef ds:uri="62fb4b83-30e1-46e4-8da3-2d63998b3e47"/>
+    <ds:schemaRef ds:uri="http://schemas.microsoft.com/office/2006/documentManagement/types"/>
+    <ds:schemaRef ds:uri="http://schemas.microsoft.com/office/infopath/2007/PartnerControls"/>
+    <ds:schemaRef ds:uri="http://schemas.openxmlformats.org/package/2006/metadata/core-properties"/>
+    <ds:schemaRef ds:uri="http://purl.org/dc/elements/1.1/"/>
+    <ds:schemaRef ds:uri="http://purl.org/dc/terms/"/>
+    <ds:schemaRef ds:uri="http://schemas.microsoft.com/internal/obd"/>
+  </ds:schemaRefs>
+</ds:datastoreItem>
 </file>
</xml_diff>